<commit_message>
File Handling and G,D
</commit_message>
<xml_diff>
--- a/Exception Handling/Python_Exception Handling.pptx
+++ b/Exception Handling/Python_Exception Handling.pptx
@@ -120,6 +120,11 @@
       </a:defRPr>
     </a:lvl9pPr>
   </p:defaultTextStyle>
+  <p:extLst>
+    <p:ext uri="{EFAFB233-063F-42B5-8137-9DF3F51BA10A}">
+      <p15:sldGuideLst xmlns:p15="http://schemas.microsoft.com/office/powerpoint/2012/main"/>
+    </p:ext>
+  </p:extLst>
 </p:presentation>
 </file>
 
@@ -349,7 +354,7 @@
           <a:p>
             <a:fld id="{A042A326-4888-4CDB-A0B3-8FFE7629B13F}" type="datetimeFigureOut">
               <a:rPr lang="en-IN" smtClean="0"/>
-              <a:t>23-12-2020</a:t>
+              <a:t>24-12-2020</a:t>
             </a:fld>
             <a:endParaRPr lang="en-IN"/>
           </a:p>
@@ -557,7 +562,7 @@
           <a:p>
             <a:fld id="{A042A326-4888-4CDB-A0B3-8FFE7629B13F}" type="datetimeFigureOut">
               <a:rPr lang="en-IN" smtClean="0"/>
-              <a:t>23-12-2020</a:t>
+              <a:t>24-12-2020</a:t>
             </a:fld>
             <a:endParaRPr lang="en-IN"/>
           </a:p>
@@ -813,7 +818,7 @@
           <a:p>
             <a:fld id="{A042A326-4888-4CDB-A0B3-8FFE7629B13F}" type="datetimeFigureOut">
               <a:rPr lang="en-IN" smtClean="0"/>
-              <a:t>23-12-2020</a:t>
+              <a:t>24-12-2020</a:t>
             </a:fld>
             <a:endParaRPr lang="en-IN"/>
           </a:p>
@@ -987,7 +992,7 @@
           <a:p>
             <a:fld id="{A042A326-4888-4CDB-A0B3-8FFE7629B13F}" type="datetimeFigureOut">
               <a:rPr lang="en-IN" smtClean="0"/>
-              <a:t>23-12-2020</a:t>
+              <a:t>24-12-2020</a:t>
             </a:fld>
             <a:endParaRPr lang="en-IN"/>
           </a:p>
@@ -1330,7 +1335,7 @@
           <a:p>
             <a:fld id="{A042A326-4888-4CDB-A0B3-8FFE7629B13F}" type="datetimeFigureOut">
               <a:rPr lang="en-IN" smtClean="0"/>
-              <a:t>23-12-2020</a:t>
+              <a:t>24-12-2020</a:t>
             </a:fld>
             <a:endParaRPr lang="en-IN"/>
           </a:p>
@@ -1605,7 +1610,7 @@
           <a:p>
             <a:fld id="{A042A326-4888-4CDB-A0B3-8FFE7629B13F}" type="datetimeFigureOut">
               <a:rPr lang="en-IN" smtClean="0"/>
-              <a:t>23-12-2020</a:t>
+              <a:t>24-12-2020</a:t>
             </a:fld>
             <a:endParaRPr lang="en-IN"/>
           </a:p>
@@ -1984,7 +1989,7 @@
           <a:p>
             <a:fld id="{A042A326-4888-4CDB-A0B3-8FFE7629B13F}" type="datetimeFigureOut">
               <a:rPr lang="en-IN" smtClean="0"/>
-              <a:t>23-12-2020</a:t>
+              <a:t>24-12-2020</a:t>
             </a:fld>
             <a:endParaRPr lang="en-IN"/>
           </a:p>
@@ -2102,7 +2107,7 @@
           <a:p>
             <a:fld id="{A042A326-4888-4CDB-A0B3-8FFE7629B13F}" type="datetimeFigureOut">
               <a:rPr lang="en-IN" smtClean="0"/>
-              <a:t>23-12-2020</a:t>
+              <a:t>24-12-2020</a:t>
             </a:fld>
             <a:endParaRPr lang="en-IN"/>
           </a:p>
@@ -2273,7 +2278,7 @@
           <a:p>
             <a:fld id="{A042A326-4888-4CDB-A0B3-8FFE7629B13F}" type="datetimeFigureOut">
               <a:rPr lang="en-IN" smtClean="0"/>
-              <a:t>23-12-2020</a:t>
+              <a:t>24-12-2020</a:t>
             </a:fld>
             <a:endParaRPr lang="en-IN"/>
           </a:p>
@@ -2627,7 +2632,7 @@
           <a:p>
             <a:fld id="{A042A326-4888-4CDB-A0B3-8FFE7629B13F}" type="datetimeFigureOut">
               <a:rPr lang="en-IN" smtClean="0"/>
-              <a:t>23-12-2020</a:t>
+              <a:t>24-12-2020</a:t>
             </a:fld>
             <a:endParaRPr lang="en-IN"/>
           </a:p>
@@ -3009,7 +3014,7 @@
           <a:p>
             <a:fld id="{A042A326-4888-4CDB-A0B3-8FFE7629B13F}" type="datetimeFigureOut">
               <a:rPr lang="en-IN" smtClean="0"/>
-              <a:t>23-12-2020</a:t>
+              <a:t>24-12-2020</a:t>
             </a:fld>
             <a:endParaRPr lang="en-IN"/>
           </a:p>
@@ -3296,7 +3301,7 @@
           <a:p>
             <a:fld id="{A042A326-4888-4CDB-A0B3-8FFE7629B13F}" type="datetimeFigureOut">
               <a:rPr lang="en-IN" smtClean="0"/>
-              <a:t>23-12-2020</a:t>
+              <a:t>24-12-2020</a:t>
             </a:fld>
             <a:endParaRPr lang="en-IN"/>
           </a:p>

</xml_diff>